<commit_message>
done with IKE now homework 5
</commit_message>
<xml_diff>
--- a/Assignments/InternetKeyExchange/Internet Key Exchange.pptx
+++ b/Assignments/InternetKeyExchange/Internet Key Exchange.pptx
@@ -6083,124 +6083,180 @@
         </p:nvSpPr>
         <p:spPr bwMode="auto"/>
         <p:txBody>
+          <a:bodyPr>
+            <a:normAutofit lnSpcReduction="10000"/>
+          </a:bodyPr>
+          <a:lstStyle/>
+          <a:p>
+            <a:pPr>
+              <a:defRPr/>
+            </a:pPr>
+            <a:r>
+              <a:rPr lang="en-US" dirty="0"/>
+              <a:t>History of IKE</a:t>
+            </a:r>
+            <a:endParaRPr dirty="0"/>
+          </a:p>
+          <a:p>
+            <a:pPr>
+              <a:defRPr/>
+            </a:pPr>
+            <a:r>
+              <a:rPr lang="en-US" dirty="0"/>
+              <a:t>Why IKE is used</a:t>
+            </a:r>
+            <a:endParaRPr dirty="0"/>
+          </a:p>
+          <a:p>
+            <a:pPr>
+              <a:defRPr/>
+            </a:pPr>
+            <a:r>
+              <a:rPr lang="en-US" dirty="0"/>
+              <a:t>What is IKE</a:t>
+            </a:r>
+            <a:endParaRPr dirty="0"/>
+          </a:p>
+          <a:p>
+            <a:pPr lvl="1">
+              <a:defRPr/>
+            </a:pPr>
+            <a:r>
+              <a:rPr lang="en-US" dirty="0"/>
+              <a:t>IKE Phases</a:t>
+            </a:r>
+            <a:endParaRPr dirty="0"/>
+          </a:p>
+          <a:p>
+            <a:pPr lvl="1">
+              <a:defRPr/>
+            </a:pPr>
+            <a:r>
+              <a:rPr lang="en-US" dirty="0"/>
+              <a:t>Mode of Operation</a:t>
+            </a:r>
+            <a:endParaRPr dirty="0"/>
+          </a:p>
+          <a:p>
+            <a:pPr lvl="1">
+              <a:defRPr/>
+            </a:pPr>
+            <a:r>
+              <a:rPr lang="en-US" dirty="0"/>
+              <a:t>Authentication Methods</a:t>
+            </a:r>
+          </a:p>
+          <a:p>
+            <a:pPr lvl="1">
+              <a:defRPr/>
+            </a:pPr>
+            <a:r>
+              <a:rPr lang="en-US" dirty="0"/>
+              <a:t>Key Determination and Cookies</a:t>
+            </a:r>
+            <a:endParaRPr dirty="0"/>
+          </a:p>
+          <a:p>
+            <a:pPr lvl="1">
+              <a:defRPr/>
+            </a:pPr>
+            <a:r>
+              <a:rPr lang="en-US" dirty="0"/>
+              <a:t>Session Keys</a:t>
+            </a:r>
+            <a:endParaRPr dirty="0"/>
+          </a:p>
+          <a:p>
+            <a:pPr lvl="1">
+              <a:defRPr/>
+            </a:pPr>
+            <a:r>
+              <a:rPr lang="en-US" dirty="0"/>
+              <a:t>ISAKMP/IKE</a:t>
+            </a:r>
+          </a:p>
+          <a:p>
+            <a:pPr>
+              <a:defRPr/>
+            </a:pPr>
+            <a:r>
+              <a:rPr lang="en-US" dirty="0"/>
+              <a:t>IKEv2</a:t>
+            </a:r>
+            <a:endParaRPr dirty="0"/>
+          </a:p>
+          <a:p>
+            <a:pPr lvl="1">
+              <a:defRPr/>
+            </a:pPr>
+            <a:endParaRPr lang="en-US" dirty="0"/>
+          </a:p>
+        </p:txBody>
+      </p:sp>
+      <p:sp>
+        <p:nvSpPr>
+          <p:cNvPr id="4" name="Footer Placeholder 3"/>
+          <p:cNvSpPr>
+            <a:spLocks noGrp="1"/>
+          </p:cNvSpPr>
+          <p:nvPr>
+            <p:ph type="ftr" sz="quarter" idx="11"/>
+          </p:nvPr>
+        </p:nvSpPr>
+        <p:spPr bwMode="auto"/>
+        <p:txBody>
           <a:bodyPr/>
           <a:lstStyle/>
           <a:p>
             <a:pPr>
               <a:defRPr/>
             </a:pPr>
-            <a:r>
-              <a:rPr lang="en-US"/>
-              <a:t>History of IKE</a:t>
-            </a:r>
-            <a:endParaRPr/>
-          </a:p>
-          <a:p>
-            <a:pPr>
-              <a:defRPr/>
-            </a:pPr>
-            <a:r>
-              <a:rPr lang="en-US"/>
-              <a:t>Why IKE is used</a:t>
-            </a:r>
-            <a:endParaRPr/>
-          </a:p>
-          <a:p>
-            <a:pPr>
-              <a:defRPr/>
-            </a:pPr>
-            <a:r>
-              <a:rPr lang="en-US"/>
-              <a:t>What is IKE</a:t>
-            </a:r>
-            <a:endParaRPr/>
-          </a:p>
-          <a:p>
-            <a:pPr lvl="1">
-              <a:defRPr/>
-            </a:pPr>
-            <a:r>
-              <a:rPr lang="en-US"/>
-              <a:t>IKE Phases</a:t>
-            </a:r>
-            <a:endParaRPr/>
-          </a:p>
-          <a:p>
-            <a:pPr lvl="1">
-              <a:defRPr/>
-            </a:pPr>
-            <a:r>
-              <a:rPr lang="en-US"/>
-              <a:t>Mode of Operation</a:t>
-            </a:r>
-            <a:endParaRPr/>
-          </a:p>
-          <a:p>
-            <a:pPr lvl="1">
-              <a:defRPr/>
-            </a:pPr>
-            <a:r>
-              <a:rPr lang="en-US"/>
-              <a:t>Authentication Methods</a:t>
-            </a:r>
-            <a:endParaRPr/>
-          </a:p>
-          <a:p>
-            <a:pPr lvl="1">
-              <a:defRPr/>
-            </a:pPr>
-            <a:r>
-              <a:rPr lang="en-US"/>
-              <a:t>Session Keys</a:t>
-            </a:r>
-            <a:endParaRPr/>
-          </a:p>
-          <a:p>
-            <a:pPr lvl="1">
-              <a:defRPr/>
-            </a:pPr>
-            <a:r>
-              <a:rPr lang="en-US"/>
-              <a:t>ISAKMP/IKE</a:t>
-            </a:r>
-            <a:endParaRPr/>
-          </a:p>
-          <a:p>
-            <a:pPr lvl="1">
-              <a:defRPr/>
-            </a:pPr>
             <a:endParaRPr lang="en-US"/>
           </a:p>
-        </p:txBody>
-      </p:sp>
-      <p:sp>
-        <p:nvSpPr>
-          <p:cNvPr id="4" name="Footer Placeholder 3"/>
-          <p:cNvSpPr>
-            <a:spLocks noGrp="1"/>
-          </p:cNvSpPr>
-          <p:nvPr>
-            <p:ph type="ftr" sz="quarter" idx="11"/>
-          </p:nvPr>
-        </p:nvSpPr>
-        <p:spPr bwMode="auto"/>
-        <p:txBody>
-          <a:bodyPr/>
-          <a:lstStyle/>
           <a:p>
             <a:pPr>
               <a:defRPr/>
             </a:pPr>
             <a:endParaRPr lang="en-US"/>
           </a:p>
-          <a:p>
-            <a:pPr>
-              <a:defRPr/>
-            </a:pPr>
-            <a:endParaRPr lang="en-US"/>
-          </a:p>
-        </p:txBody>
-      </p:sp>
+        </p:txBody>
+      </p:sp>
+      <p:pic>
+        <p:nvPicPr>
+          <p:cNvPr id="6" name="Picture 5">
+            <a:extLst>
+              <a:ext uri="{FF2B5EF4-FFF2-40B4-BE49-F238E27FC236}">
+                <a16:creationId xmlns:a16="http://schemas.microsoft.com/office/drawing/2014/main" id="{CB1AA26A-E9B6-4C7C-BA6A-28AB875117DE}"/>
+              </a:ext>
+            </a:extLst>
+          </p:cNvPr>
+          <p:cNvPicPr>
+            <a:picLocks noChangeAspect="1"/>
+          </p:cNvPicPr>
+          <p:nvPr/>
+        </p:nvPicPr>
+        <p:blipFill>
+          <a:blip r:embed="rId2" cstate="print">
+            <a:extLst>
+              <a:ext uri="{28A0092B-C50C-407E-A947-70E740481C1C}">
+                <a14:useLocalDpi xmlns:a14="http://schemas.microsoft.com/office/drawing/2010/main" val="0"/>
+              </a:ext>
+            </a:extLst>
+          </a:blip>
+          <a:stretch>
+            <a:fillRect/>
+          </a:stretch>
+        </p:blipFill>
+        <p:spPr>
+          <a:xfrm>
+            <a:off x="5523475" y="4221088"/>
+            <a:ext cx="664890" cy="405421"/>
+          </a:xfrm>
+          <a:prstGeom prst="rect">
+            <a:avLst/>
+          </a:prstGeom>
+        </p:spPr>
+      </p:pic>
     </p:spTree>
   </p:cSld>
   <p:clrMapOvr>
@@ -9303,12 +9359,8 @@
               <a:defRPr/>
             </a:pPr>
             <a:r>
-              <a:rPr lang="en-US"/>
-              <a:t>The Cookie </a:t>
-            </a:r>
-            <a:r>
               <a:rPr lang="en-US" dirty="0"/>
-              <a:t>Exchange </a:t>
+              <a:t>The Cookie Exchange </a:t>
             </a:r>
             <a:endParaRPr dirty="0"/>
           </a:p>

</xml_diff>